<commit_message>
report aggiornato e presentazione
</commit_message>
<xml_diff>
--- a/documentiVari/Presentazione progetto.pptx
+++ b/documentiVari/Presentazione progetto.pptx
@@ -293,7 +293,7 @@
           <a:p>
             <a:fld id="{1D8BD707-D9CF-40AE-B4C6-C98DA3205C09}" type="datetimeFigureOut">
               <a:rPr lang="en-US"/>
-              <a:t>6/15/2023</a:t>
+              <a:t>6/20/2023</a:t>
             </a:fld>
             <a:endParaRPr lang="en-US"/>
           </a:p>
@@ -477,7 +477,7 @@
           <a:p>
             <a:fld id="{1D8BD707-D9CF-40AE-B4C6-C98DA3205C09}" type="datetimeFigureOut">
               <a:rPr lang="en-US"/>
-              <a:t>6/15/2023</a:t>
+              <a:t>6/20/2023</a:t>
             </a:fld>
             <a:endParaRPr lang="en-US"/>
           </a:p>
@@ -700,7 +700,7 @@
           <a:p>
             <a:fld id="{1D8BD707-D9CF-40AE-B4C6-C98DA3205C09}" type="datetimeFigureOut">
               <a:rPr lang="en-US"/>
-              <a:t>6/15/2023</a:t>
+              <a:t>6/20/2023</a:t>
             </a:fld>
             <a:endParaRPr lang="en-US"/>
           </a:p>
@@ -865,7 +865,7 @@
           <a:p>
             <a:fld id="{1D8BD707-D9CF-40AE-B4C6-C98DA3205C09}" type="datetimeFigureOut">
               <a:rPr lang="en-US"/>
-              <a:t>6/15/2023</a:t>
+              <a:t>6/20/2023</a:t>
             </a:fld>
             <a:endParaRPr lang="en-US"/>
           </a:p>
@@ -993,7 +993,7 @@
           <a:p>
             <a:fld id="{1D8BD707-D9CF-40AE-B4C6-C98DA3205C09}" type="datetimeFigureOut">
               <a:rPr lang="en-US"/>
-              <a:t>6/15/2023</a:t>
+              <a:t>6/20/2023</a:t>
             </a:fld>
             <a:endParaRPr lang="en-US"/>
           </a:p>
@@ -1275,7 +1275,7 @@
           <a:p>
             <a:fld id="{1D8BD707-D9CF-40AE-B4C6-C98DA3205C09}" type="datetimeFigureOut">
               <a:rPr lang="en-US"/>
-              <a:t>6/15/2023</a:t>
+              <a:t>6/20/2023</a:t>
             </a:fld>
             <a:endParaRPr lang="en-US"/>
           </a:p>
@@ -1963,7 +1963,19 @@
               <a:rPr lang="it-IT" sz="900" spc="-20" dirty="0">
                 <a:cs typeface="Arial MT"/>
               </a:rPr>
-              <a:t> precedentemente al vertice opposto (di newT1 o newT2, che verrà ‘’spento’’) ;</a:t>
+              <a:t> precedentemente a </a:t>
+            </a:r>
+            <a:r>
+              <a:rPr lang="it-IT" sz="900" spc="-20" dirty="0" err="1">
+                <a:cs typeface="Arial MT"/>
+              </a:rPr>
+              <a:t>newVertex</a:t>
+            </a:r>
+            <a:r>
+              <a:rPr lang="it-IT" sz="900" spc="-20" dirty="0">
+                <a:cs typeface="Arial MT"/>
+              </a:rPr>
+              <a:t> ;</a:t>
             </a:r>
           </a:p>
           <a:p>
@@ -1987,7 +1999,7 @@
               <a:rPr lang="it-IT" sz="900" spc="-20" dirty="0">
                 <a:cs typeface="Arial MT"/>
               </a:rPr>
-              <a:t>creiamo i nuovi triangoli newT3 e newT4 e li inseriamo nelle liste di triangoli:</a:t>
+              <a:t>creiamo i nuovi triangoli newT3 e newT4 (dividendo newT1 oppure newT2) e li inseriamo nelle liste di triangoli:</a:t>
             </a:r>
           </a:p>
           <a:p>
@@ -3058,7 +3070,7 @@
               <a:rPr lang="it-IT" sz="900" spc="-20" dirty="0">
                 <a:cs typeface="Arial MT"/>
               </a:rPr>
-              <a:t> è dato da : percentuale* (numero iniziale di triangoli)/100; (la percentuale è specificata dall’utente nella </a:t>
+              <a:t> è dato da : percentuale* (numero iniziale di triangoli)/100 (la percentuale è specificata dall’utente nella </a:t>
             </a:r>
             <a:r>
               <a:rPr lang="it-IT" sz="900" spc="-20" dirty="0" err="1">
@@ -3499,6 +3511,35 @@
           <a:chExt cx="0" cy="0"/>
         </a:xfrm>
       </p:grpSpPr>
+      <p:pic>
+        <p:nvPicPr>
+          <p:cNvPr id="5" name="Immagine 4">
+            <a:extLst>
+              <a:ext uri="{FF2B5EF4-FFF2-40B4-BE49-F238E27FC236}">
+                <a16:creationId xmlns:a16="http://schemas.microsoft.com/office/drawing/2014/main" id="{03B66DF3-5A7D-98AB-87D5-7A6E8EF050A9}"/>
+              </a:ext>
+            </a:extLst>
+          </p:cNvPr>
+          <p:cNvPicPr>
+            <a:picLocks noChangeAspect="1"/>
+          </p:cNvPicPr>
+          <p:nvPr/>
+        </p:nvPicPr>
+        <p:blipFill rotWithShape="1">
+          <a:blip r:embed="rId2"/>
+          <a:srcRect l="10950" t="5459" r="1446"/>
+          <a:stretch/>
+        </p:blipFill>
+        <p:spPr>
+          <a:xfrm>
+            <a:off x="323849" y="815975"/>
+            <a:ext cx="4038601" cy="2451615"/>
+          </a:xfrm>
+          <a:prstGeom prst="rect">
+            <a:avLst/>
+          </a:prstGeom>
+        </p:spPr>
+      </p:pic>
       <p:sp>
         <p:nvSpPr>
           <p:cNvPr id="2" name="Titolo 1">
@@ -3565,41 +3606,6 @@
           </a:p>
         </p:txBody>
       </p:sp>
-      <p:pic>
-        <p:nvPicPr>
-          <p:cNvPr id="6" name="Immagine 5" descr="Immagine che contiene linea, design, modello&#10;&#10;Descrizione generata automaticamente">
-            <a:extLst>
-              <a:ext uri="{FF2B5EF4-FFF2-40B4-BE49-F238E27FC236}">
-                <a16:creationId xmlns:a16="http://schemas.microsoft.com/office/drawing/2014/main" id="{03BD0878-3553-35EB-CB57-9B34DFB7C5E9}"/>
-              </a:ext>
-            </a:extLst>
-          </p:cNvPr>
-          <p:cNvPicPr>
-            <a:picLocks noChangeAspect="1"/>
-          </p:cNvPicPr>
-          <p:nvPr/>
-        </p:nvPicPr>
-        <p:blipFill rotWithShape="1">
-          <a:blip r:embed="rId2" cstate="print">
-            <a:extLst>
-              <a:ext uri="{28A0092B-C50C-407E-A947-70E740481C1C}">
-                <a14:useLocalDpi xmlns:a14="http://schemas.microsoft.com/office/drawing/2010/main" val="0"/>
-              </a:ext>
-            </a:extLst>
-          </a:blip>
-          <a:srcRect l="6547"/>
-          <a:stretch/>
-        </p:blipFill>
-        <p:spPr>
-          <a:xfrm>
-            <a:off x="98640" y="674410"/>
-            <a:ext cx="4308258" cy="2593181"/>
-          </a:xfrm>
-          <a:prstGeom prst="rect">
-            <a:avLst/>
-          </a:prstGeom>
-        </p:spPr>
-      </p:pic>
     </p:spTree>
     <p:extLst>
       <p:ext uri="{BB962C8B-B14F-4D97-AF65-F5344CB8AC3E}">
@@ -5404,6 +5410,36 @@
           <a:chExt cx="0" cy="0"/>
         </a:xfrm>
       </p:grpSpPr>
+      <p:pic>
+        <p:nvPicPr>
+          <p:cNvPr id="5" name="Immagine 4">
+            <a:extLst>
+              <a:ext uri="{FF2B5EF4-FFF2-40B4-BE49-F238E27FC236}">
+                <a16:creationId xmlns:a16="http://schemas.microsoft.com/office/drawing/2014/main" id="{CD0869F8-ECA6-CB07-BE3E-47EA82DE6531}"/>
+              </a:ext>
+            </a:extLst>
+          </p:cNvPr>
+          <p:cNvPicPr>
+            <a:picLocks noChangeAspect="1"/>
+          </p:cNvPicPr>
+          <p:nvPr/>
+        </p:nvPicPr>
+        <p:blipFill>
+          <a:blip r:embed="rId2"/>
+          <a:stretch>
+            <a:fillRect/>
+          </a:stretch>
+        </p:blipFill>
+        <p:spPr>
+          <a:xfrm>
+            <a:off x="476250" y="936461"/>
+            <a:ext cx="3958746" cy="2400325"/>
+          </a:xfrm>
+          <a:prstGeom prst="rect">
+            <a:avLst/>
+          </a:prstGeom>
+        </p:spPr>
+      </p:pic>
       <p:sp>
         <p:nvSpPr>
           <p:cNvPr id="2" name="Titolo 1">
@@ -5498,41 +5534,6 @@
           </a:p>
         </p:txBody>
       </p:sp>
-      <p:pic>
-        <p:nvPicPr>
-          <p:cNvPr id="4" name="Immagine 3" descr="Immagine che contiene linea, design, modello&#10;&#10;Descrizione generata automaticamente">
-            <a:extLst>
-              <a:ext uri="{FF2B5EF4-FFF2-40B4-BE49-F238E27FC236}">
-                <a16:creationId xmlns:a16="http://schemas.microsoft.com/office/drawing/2014/main" id="{71A483B7-89AE-6A74-81D3-E52AE1E90D81}"/>
-              </a:ext>
-            </a:extLst>
-          </p:cNvPr>
-          <p:cNvPicPr>
-            <a:picLocks noChangeAspect="1"/>
-          </p:cNvPicPr>
-          <p:nvPr/>
-        </p:nvPicPr>
-        <p:blipFill rotWithShape="1">
-          <a:blip r:embed="rId2" cstate="print">
-            <a:extLst>
-              <a:ext uri="{28A0092B-C50C-407E-A947-70E740481C1C}">
-                <a14:useLocalDpi xmlns:a14="http://schemas.microsoft.com/office/drawing/2010/main" val="0"/>
-              </a:ext>
-            </a:extLst>
-          </a:blip>
-          <a:srcRect l="6547"/>
-          <a:stretch/>
-        </p:blipFill>
-        <p:spPr>
-          <a:xfrm>
-            <a:off x="150920" y="804432"/>
-            <a:ext cx="4308258" cy="2593181"/>
-          </a:xfrm>
-          <a:prstGeom prst="rect">
-            <a:avLst/>
-          </a:prstGeom>
-        </p:spPr>
-      </p:pic>
     </p:spTree>
     <p:extLst>
       <p:ext uri="{BB962C8B-B14F-4D97-AF65-F5344CB8AC3E}">
@@ -5679,7 +5680,7 @@
             </a:pPr>
             <a:r>
               <a:rPr lang="it-IT" sz="900" dirty="0"/>
-              <a:t>selezioniamo il triangolo di area maggiore, che verrà raffinato;</a:t>
+              <a:t>selezioniamo il triangolo di area massima, che verrà raffinato;</a:t>
             </a:r>
           </a:p>
           <a:p>
@@ -5926,7 +5927,7 @@
             </a:pPr>
             <a:r>
               <a:rPr lang="it-IT" sz="900" dirty="0"/>
-              <a:t>creiamo i due nuovi triangoli newT1 e newT2, li inseriamo nelle liste di triangoli e spegniamo il triangolo appena raffinato:</a:t>
+              <a:t>creiamo i due nuovi triangoli newT1 e newT2, li inseriamo nei vettori di triangoli e spegniamo il triangolo appena raffinato:</a:t>
             </a:r>
           </a:p>
         </p:txBody>

</xml_diff>

<commit_message>
eliminata slide sbagliata eheh
</commit_message>
<xml_diff>
--- a/documentiVari/Presentazione progetto.pptx
+++ b/documentiVari/Presentazione progetto.pptx
@@ -27,8 +27,7 @@
     <p:sldId id="280" r:id="rId21"/>
     <p:sldId id="281" r:id="rId22"/>
     <p:sldId id="282" r:id="rId23"/>
-    <p:sldId id="258" r:id="rId24"/>
-    <p:sldId id="260" r:id="rId25"/>
+    <p:sldId id="260" r:id="rId24"/>
   </p:sldIdLst>
   <p:sldSz cx="4610100" cy="3460750"/>
   <p:notesSz cx="4610100" cy="3460750"/>
@@ -4925,205 +4924,6 @@
 </file>
 
 <file path=ppt/slides/slide23.xml><?xml version="1.0" encoding="utf-8"?>
-<p:sld xmlns:a="http://schemas.openxmlformats.org/drawingml/2006/main" xmlns:r="http://schemas.openxmlformats.org/officeDocument/2006/relationships" xmlns:p="http://schemas.openxmlformats.org/presentationml/2006/main">
-  <p:cSld>
-    <p:spTree>
-      <p:nvGrpSpPr>
-        <p:cNvPr id="1" name=""/>
-        <p:cNvGrpSpPr/>
-        <p:nvPr/>
-      </p:nvGrpSpPr>
-      <p:grpSpPr>
-        <a:xfrm>
-          <a:off x="0" y="0"/>
-          <a:ext cx="0" cy="0"/>
-          <a:chOff x="0" y="0"/>
-          <a:chExt cx="0" cy="0"/>
-        </a:xfrm>
-      </p:grpSpPr>
-      <p:sp>
-        <p:nvSpPr>
-          <p:cNvPr id="2" name="object 2"/>
-          <p:cNvSpPr txBox="1">
-            <a:spLocks noGrp="1"/>
-          </p:cNvSpPr>
-          <p:nvPr>
-            <p:ph type="title"/>
-          </p:nvPr>
-        </p:nvSpPr>
-        <p:spPr>
-          <a:xfrm>
-            <a:off x="98640" y="59962"/>
-            <a:ext cx="899794" cy="177800"/>
-          </a:xfrm>
-          <a:prstGeom prst="rect">
-            <a:avLst/>
-          </a:prstGeom>
-        </p:spPr>
-        <p:txBody>
-          <a:bodyPr vert="horz" wrap="square" lIns="0" tIns="12065" rIns="0" bIns="0" rtlCol="0">
-            <a:spAutoFit/>
-          </a:bodyPr>
-          <a:lstStyle/>
-          <a:p>
-            <a:pPr marL="12700">
-              <a:lnSpc>
-                <a:spcPct val="100000"/>
-              </a:lnSpc>
-              <a:spcBef>
-                <a:spcPts val="95"/>
-              </a:spcBef>
-            </a:pPr>
-            <a:r>
-              <a:rPr spc="-60" dirty="0"/>
-              <a:t>Design</a:t>
-            </a:r>
-            <a:r>
-              <a:rPr spc="20" dirty="0"/>
-              <a:t> </a:t>
-            </a:r>
-            <a:r>
-              <a:rPr spc="-55" dirty="0"/>
-              <a:t>Pattern</a:t>
-            </a:r>
-          </a:p>
-        </p:txBody>
-      </p:sp>
-      <p:sp>
-        <p:nvSpPr>
-          <p:cNvPr id="9" name="CasellaDiTesto 8">
-            <a:extLst>
-              <a:ext uri="{FF2B5EF4-FFF2-40B4-BE49-F238E27FC236}">
-                <a16:creationId xmlns:a16="http://schemas.microsoft.com/office/drawing/2014/main" id="{777F8698-7282-B540-80D7-6550E1050933}"/>
-              </a:ext>
-            </a:extLst>
-          </p:cNvPr>
-          <p:cNvSpPr txBox="1"/>
-          <p:nvPr/>
-        </p:nvSpPr>
-        <p:spPr>
-          <a:xfrm>
-            <a:off x="628650" y="1044575"/>
-            <a:ext cx="3020163" cy="802336"/>
-          </a:xfrm>
-          <a:prstGeom prst="rect">
-            <a:avLst/>
-          </a:prstGeom>
-          <a:noFill/>
-        </p:spPr>
-        <p:txBody>
-          <a:bodyPr wrap="square" rtlCol="0">
-            <a:spAutoFit/>
-          </a:bodyPr>
-          <a:lstStyle/>
-          <a:p>
-            <a:pPr marL="128904" marR="5080">
-              <a:lnSpc>
-                <a:spcPct val="116199"/>
-              </a:lnSpc>
-              <a:spcBef>
-                <a:spcPts val="200"/>
-              </a:spcBef>
-              <a:buClr>
-                <a:srgbClr val="FF7F00"/>
-              </a:buClr>
-              <a:tabLst>
-                <a:tab pos="247015" algn="l"/>
-              </a:tabLst>
-            </a:pPr>
-            <a:r>
-              <a:rPr lang="it-IT" sz="900" b="1" spc="-20" dirty="0">
-                <a:cs typeface="Arial MT"/>
-              </a:rPr>
-              <a:t>Builder</a:t>
-            </a:r>
-          </a:p>
-          <a:p>
-            <a:pPr marL="300354" marR="5080" indent="-171450">
-              <a:lnSpc>
-                <a:spcPct val="116199"/>
-              </a:lnSpc>
-              <a:spcBef>
-                <a:spcPts val="200"/>
-              </a:spcBef>
-              <a:buClr>
-                <a:srgbClr val="FF7F00"/>
-              </a:buClr>
-              <a:buFont typeface="Arial" panose="020B0604020202020204" pitchFamily="34" charset="0"/>
-              <a:buChar char="•"/>
-              <a:tabLst>
-                <a:tab pos="247015" algn="l"/>
-              </a:tabLst>
-            </a:pPr>
-            <a:r>
-              <a:rPr lang="it-IT" sz="900" spc="-20" dirty="0">
-                <a:cs typeface="Arial MT"/>
-              </a:rPr>
-              <a:t>Varie implementazioni nello stesso oggetto;</a:t>
-            </a:r>
-          </a:p>
-          <a:p>
-            <a:pPr marL="300354" marR="5080" indent="-171450">
-              <a:lnSpc>
-                <a:spcPct val="116199"/>
-              </a:lnSpc>
-              <a:spcBef>
-                <a:spcPts val="200"/>
-              </a:spcBef>
-              <a:buClr>
-                <a:srgbClr val="FF7F00"/>
-              </a:buClr>
-              <a:buFont typeface="Arial" panose="020B0604020202020204" pitchFamily="34" charset="0"/>
-              <a:buChar char="•"/>
-              <a:tabLst>
-                <a:tab pos="247015" algn="l"/>
-              </a:tabLst>
-            </a:pPr>
-            <a:r>
-              <a:rPr lang="it-IT" sz="900" spc="-20" dirty="0">
-                <a:cs typeface="Arial MT"/>
-              </a:rPr>
-              <a:t>separazione della logica;</a:t>
-            </a:r>
-          </a:p>
-          <a:p>
-            <a:pPr marL="300354" marR="5080" indent="-171450">
-              <a:lnSpc>
-                <a:spcPct val="116199"/>
-              </a:lnSpc>
-              <a:spcBef>
-                <a:spcPts val="200"/>
-              </a:spcBef>
-              <a:buClr>
-                <a:srgbClr val="FF7F00"/>
-              </a:buClr>
-              <a:buFont typeface="Arial" panose="020B0604020202020204" pitchFamily="34" charset="0"/>
-              <a:buChar char="•"/>
-              <a:tabLst>
-                <a:tab pos="247015" algn="l"/>
-              </a:tabLst>
-            </a:pPr>
-            <a:r>
-              <a:rPr lang="it-IT" sz="900" spc="-20" dirty="0">
-                <a:cs typeface="Arial MT"/>
-              </a:rPr>
-              <a:t>facile da implementare.</a:t>
-            </a:r>
-          </a:p>
-        </p:txBody>
-      </p:sp>
-    </p:spTree>
-  </p:cSld>
-  <p:clrMapOvr>
-    <a:masterClrMapping/>
-  </p:clrMapOvr>
-  <p:transition>
-    <p:cut/>
-  </p:transition>
-</p:sld>
-</file>
-
-<file path=ppt/slides/slide24.xml><?xml version="1.0" encoding="utf-8"?>
 <p:sld xmlns:a="http://schemas.openxmlformats.org/drawingml/2006/main" xmlns:r="http://schemas.openxmlformats.org/officeDocument/2006/relationships" xmlns:p="http://schemas.openxmlformats.org/presentationml/2006/main">
   <p:cSld>
     <p:spTree>

</xml_diff>